<commit_message>
Add more detail on bad tags
</commit_message>
<xml_diff>
--- a/lectures/DJ-01-Structure.pptx
+++ b/lectures/DJ-01-Structure.pptx
@@ -7777,7 +7777,7 @@
             <a:pPr algn="ctr"/>
             <a:r>
               <a:rPr lang="en-US" dirty="0" err="1" smtClean="0"/>
-              <a:t>model.py</a:t>
+              <a:t>models.py</a:t>
             </a:r>
             <a:endParaRPr lang="en-US" dirty="0"/>
           </a:p>
@@ -9385,6 +9385,13 @@
   <p:clrMapOvr>
     <a:masterClrMapping/>
   </p:clrMapOvr>
+  <p:timing>
+    <p:tnLst>
+      <p:par>
+        <p:cTn id="1" dur="indefinite" restart="never" nodeType="tmRoot"/>
+      </p:par>
+    </p:tnLst>
+  </p:timing>
 </p:sld>
 </file>
 
@@ -10520,6 +10527,13 @@
   <p:clrMapOvr>
     <a:masterClrMapping/>
   </p:clrMapOvr>
+  <p:timing>
+    <p:tnLst>
+      <p:par>
+        <p:cTn id="1" dur="indefinite" restart="never" nodeType="tmRoot"/>
+      </p:par>
+    </p:tnLst>
+  </p:timing>
 </p:sld>
 </file>
 

</xml_diff>